<commit_message>
update SPR animations with Qualtrics
</commit_message>
<xml_diff>
--- a/resources/gifs/SPR_animations.pptx
+++ b/resources/gifs/SPR_animations.pptx
@@ -19,6 +19,8 @@
     <p:sldId id="268" r:id="rId13"/>
     <p:sldId id="269" r:id="rId14"/>
     <p:sldId id="270" r:id="rId15"/>
+    <p:sldId id="271" r:id="rId16"/>
+    <p:sldId id="272" r:id="rId17"/>
   </p:sldIdLst>
   <p:sldSz cx="4572000" cy="2743200"/>
   <p:notesSz cx="6858000" cy="9144000"/>
@@ -256,7 +258,7 @@
           <a:p>
             <a:fld id="{6B1BD8BE-0EBB-42AB-B32B-93F697908886}" type="datetimeFigureOut">
               <a:rPr lang="en-US" smtClean="0"/>
-              <a:t>10/1/2021</a:t>
+              <a:t>2/15/2022</a:t>
             </a:fld>
             <a:endParaRPr lang="en-US"/>
           </a:p>
@@ -426,7 +428,7 @@
           <a:p>
             <a:fld id="{6B1BD8BE-0EBB-42AB-B32B-93F697908886}" type="datetimeFigureOut">
               <a:rPr lang="en-US" smtClean="0"/>
-              <a:t>10/1/2021</a:t>
+              <a:t>2/15/2022</a:t>
             </a:fld>
             <a:endParaRPr lang="en-US"/>
           </a:p>
@@ -606,7 +608,7 @@
           <a:p>
             <a:fld id="{6B1BD8BE-0EBB-42AB-B32B-93F697908886}" type="datetimeFigureOut">
               <a:rPr lang="en-US" smtClean="0"/>
-              <a:t>10/1/2021</a:t>
+              <a:t>2/15/2022</a:t>
             </a:fld>
             <a:endParaRPr lang="en-US"/>
           </a:p>
@@ -776,7 +778,7 @@
           <a:p>
             <a:fld id="{6B1BD8BE-0EBB-42AB-B32B-93F697908886}" type="datetimeFigureOut">
               <a:rPr lang="en-US" smtClean="0"/>
-              <a:t>10/1/2021</a:t>
+              <a:t>2/15/2022</a:t>
             </a:fld>
             <a:endParaRPr lang="en-US"/>
           </a:p>
@@ -1022,7 +1024,7 @@
           <a:p>
             <a:fld id="{6B1BD8BE-0EBB-42AB-B32B-93F697908886}" type="datetimeFigureOut">
               <a:rPr lang="en-US" smtClean="0"/>
-              <a:t>10/1/2021</a:t>
+              <a:t>2/15/2022</a:t>
             </a:fld>
             <a:endParaRPr lang="en-US"/>
           </a:p>
@@ -1254,7 +1256,7 @@
           <a:p>
             <a:fld id="{6B1BD8BE-0EBB-42AB-B32B-93F697908886}" type="datetimeFigureOut">
               <a:rPr lang="en-US" smtClean="0"/>
-              <a:t>10/1/2021</a:t>
+              <a:t>2/15/2022</a:t>
             </a:fld>
             <a:endParaRPr lang="en-US"/>
           </a:p>
@@ -1621,7 +1623,7 @@
           <a:p>
             <a:fld id="{6B1BD8BE-0EBB-42AB-B32B-93F697908886}" type="datetimeFigureOut">
               <a:rPr lang="en-US" smtClean="0"/>
-              <a:t>10/1/2021</a:t>
+              <a:t>2/15/2022</a:t>
             </a:fld>
             <a:endParaRPr lang="en-US"/>
           </a:p>
@@ -1739,7 +1741,7 @@
           <a:p>
             <a:fld id="{6B1BD8BE-0EBB-42AB-B32B-93F697908886}" type="datetimeFigureOut">
               <a:rPr lang="en-US" smtClean="0"/>
-              <a:t>10/1/2021</a:t>
+              <a:t>2/15/2022</a:t>
             </a:fld>
             <a:endParaRPr lang="en-US"/>
           </a:p>
@@ -1834,7 +1836,7 @@
           <a:p>
             <a:fld id="{6B1BD8BE-0EBB-42AB-B32B-93F697908886}" type="datetimeFigureOut">
               <a:rPr lang="en-US" smtClean="0"/>
-              <a:t>10/1/2021</a:t>
+              <a:t>2/15/2022</a:t>
             </a:fld>
             <a:endParaRPr lang="en-US"/>
           </a:p>
@@ -2111,7 +2113,7 @@
           <a:p>
             <a:fld id="{6B1BD8BE-0EBB-42AB-B32B-93F697908886}" type="datetimeFigureOut">
               <a:rPr lang="en-US" smtClean="0"/>
-              <a:t>10/1/2021</a:t>
+              <a:t>2/15/2022</a:t>
             </a:fld>
             <a:endParaRPr lang="en-US"/>
           </a:p>
@@ -2368,7 +2370,7 @@
           <a:p>
             <a:fld id="{6B1BD8BE-0EBB-42AB-B32B-93F697908886}" type="datetimeFigureOut">
               <a:rPr lang="en-US" smtClean="0"/>
-              <a:t>10/1/2021</a:t>
+              <a:t>2/15/2022</a:t>
             </a:fld>
             <a:endParaRPr lang="en-US"/>
           </a:p>
@@ -2581,7 +2583,7 @@
           <a:p>
             <a:fld id="{6B1BD8BE-0EBB-42AB-B32B-93F697908886}" type="datetimeFigureOut">
               <a:rPr lang="en-US" smtClean="0"/>
-              <a:t>10/1/2021</a:t>
+              <a:t>2/15/2022</a:t>
             </a:fld>
             <a:endParaRPr lang="en-US"/>
           </a:p>
@@ -4686,6 +4688,256 @@
 </p:sld>
 </file>
 
+<file path=ppt/slides/slide15.xml><?xml version="1.0" encoding="utf-8"?>
+<p:sld xmlns:a="http://schemas.openxmlformats.org/drawingml/2006/main" xmlns:r="http://schemas.openxmlformats.org/officeDocument/2006/relationships" xmlns:p="http://schemas.openxmlformats.org/presentationml/2006/main">
+  <p:cSld>
+    <p:spTree>
+      <p:nvGrpSpPr>
+        <p:cNvPr id="1" name=""/>
+        <p:cNvGrpSpPr/>
+        <p:nvPr/>
+      </p:nvGrpSpPr>
+      <p:grpSpPr>
+        <a:xfrm>
+          <a:off x="0" y="0"/>
+          <a:ext cx="0" cy="0"/>
+          <a:chOff x="0" y="0"/>
+          <a:chExt cx="0" cy="0"/>
+        </a:xfrm>
+      </p:grpSpPr>
+      <p:sp>
+        <p:nvSpPr>
+          <p:cNvPr id="2" name="Title 1">
+            <a:extLst>
+              <a:ext uri="{FF2B5EF4-FFF2-40B4-BE49-F238E27FC236}">
+                <a16:creationId xmlns:a16="http://schemas.microsoft.com/office/drawing/2014/main" id="{0A57CD36-C4DA-4C87-9AD5-C6C3B864DD74}"/>
+              </a:ext>
+            </a:extLst>
+          </p:cNvPr>
+          <p:cNvSpPr>
+            <a:spLocks noGrp="1"/>
+          </p:cNvSpPr>
+          <p:nvPr>
+            <p:ph type="title"/>
+          </p:nvPr>
+        </p:nvSpPr>
+        <p:spPr/>
+        <p:txBody>
+          <a:bodyPr/>
+          <a:lstStyle/>
+          <a:p>
+            <a:endParaRPr lang="en-SG"/>
+          </a:p>
+        </p:txBody>
+      </p:sp>
+      <p:sp>
+        <p:nvSpPr>
+          <p:cNvPr id="3" name="Content Placeholder 2">
+            <a:extLst>
+              <a:ext uri="{FF2B5EF4-FFF2-40B4-BE49-F238E27FC236}">
+                <a16:creationId xmlns:a16="http://schemas.microsoft.com/office/drawing/2014/main" id="{9873E0F2-DCA3-4AF6-8709-8C6FDFA832E9}"/>
+              </a:ext>
+            </a:extLst>
+          </p:cNvPr>
+          <p:cNvSpPr>
+            <a:spLocks noGrp="1"/>
+          </p:cNvSpPr>
+          <p:nvPr>
+            <p:ph idx="1"/>
+          </p:nvPr>
+        </p:nvSpPr>
+        <p:spPr/>
+        <p:txBody>
+          <a:bodyPr/>
+          <a:lstStyle/>
+          <a:p>
+            <a:endParaRPr lang="en-SG"/>
+          </a:p>
+        </p:txBody>
+      </p:sp>
+      <p:pic>
+        <p:nvPicPr>
+          <p:cNvPr id="7" name="Picture 6">
+            <a:extLst>
+              <a:ext uri="{FF2B5EF4-FFF2-40B4-BE49-F238E27FC236}">
+                <a16:creationId xmlns:a16="http://schemas.microsoft.com/office/drawing/2014/main" id="{C35B81A4-21E2-4AEE-9D6B-9E4C44A453E0}"/>
+              </a:ext>
+            </a:extLst>
+          </p:cNvPr>
+          <p:cNvPicPr>
+            <a:picLocks noChangeAspect="1"/>
+          </p:cNvPicPr>
+          <p:nvPr/>
+        </p:nvPicPr>
+        <p:blipFill>
+          <a:blip r:embed="rId2"/>
+          <a:stretch>
+            <a:fillRect/>
+          </a:stretch>
+        </p:blipFill>
+        <p:spPr>
+          <a:xfrm>
+            <a:off x="-32368" y="1312405"/>
+            <a:ext cx="4572000" cy="1323879"/>
+          </a:xfrm>
+          <a:prstGeom prst="rect">
+            <a:avLst/>
+          </a:prstGeom>
+        </p:spPr>
+      </p:pic>
+      <p:pic>
+        <p:nvPicPr>
+          <p:cNvPr id="8" name="Picture 7">
+            <a:extLst>
+              <a:ext uri="{FF2B5EF4-FFF2-40B4-BE49-F238E27FC236}">
+                <a16:creationId xmlns:a16="http://schemas.microsoft.com/office/drawing/2014/main" id="{D6BD42EA-E303-4F1B-B4D6-254775D75439}"/>
+              </a:ext>
+            </a:extLst>
+          </p:cNvPr>
+          <p:cNvPicPr>
+            <a:picLocks noChangeAspect="1"/>
+          </p:cNvPicPr>
+          <p:nvPr/>
+        </p:nvPicPr>
+        <p:blipFill>
+          <a:blip r:embed="rId3"/>
+          <a:stretch>
+            <a:fillRect/>
+          </a:stretch>
+        </p:blipFill>
+        <p:spPr>
+          <a:xfrm>
+            <a:off x="0" y="-48651"/>
+            <a:ext cx="4572000" cy="1449852"/>
+          </a:xfrm>
+          <a:prstGeom prst="rect">
+            <a:avLst/>
+          </a:prstGeom>
+        </p:spPr>
+      </p:pic>
+    </p:spTree>
+    <p:extLst>
+      <p:ext uri="{BB962C8B-B14F-4D97-AF65-F5344CB8AC3E}">
+        <p14:creationId xmlns:p14="http://schemas.microsoft.com/office/powerpoint/2010/main" val="323014367"/>
+      </p:ext>
+    </p:extLst>
+  </p:cSld>
+  <p:clrMapOvr>
+    <a:masterClrMapping/>
+  </p:clrMapOvr>
+</p:sld>
+</file>
+
+<file path=ppt/slides/slide16.xml><?xml version="1.0" encoding="utf-8"?>
+<p:sld xmlns:a="http://schemas.openxmlformats.org/drawingml/2006/main" xmlns:r="http://schemas.openxmlformats.org/officeDocument/2006/relationships" xmlns:p="http://schemas.openxmlformats.org/presentationml/2006/main">
+  <p:cSld>
+    <p:spTree>
+      <p:nvGrpSpPr>
+        <p:cNvPr id="1" name=""/>
+        <p:cNvGrpSpPr/>
+        <p:nvPr/>
+      </p:nvGrpSpPr>
+      <p:grpSpPr>
+        <a:xfrm>
+          <a:off x="0" y="0"/>
+          <a:ext cx="0" cy="0"/>
+          <a:chOff x="0" y="0"/>
+          <a:chExt cx="0" cy="0"/>
+        </a:xfrm>
+      </p:grpSpPr>
+      <p:sp>
+        <p:nvSpPr>
+          <p:cNvPr id="2" name="Title 1">
+            <a:extLst>
+              <a:ext uri="{FF2B5EF4-FFF2-40B4-BE49-F238E27FC236}">
+                <a16:creationId xmlns:a16="http://schemas.microsoft.com/office/drawing/2014/main" id="{DE2AC116-8F08-47DC-897D-B95EB1302352}"/>
+              </a:ext>
+            </a:extLst>
+          </p:cNvPr>
+          <p:cNvSpPr>
+            <a:spLocks noGrp="1"/>
+          </p:cNvSpPr>
+          <p:nvPr>
+            <p:ph type="title"/>
+          </p:nvPr>
+        </p:nvSpPr>
+        <p:spPr/>
+        <p:txBody>
+          <a:bodyPr/>
+          <a:lstStyle/>
+          <a:p>
+            <a:endParaRPr lang="en-SG"/>
+          </a:p>
+        </p:txBody>
+      </p:sp>
+      <p:sp>
+        <p:nvSpPr>
+          <p:cNvPr id="3" name="Content Placeholder 2">
+            <a:extLst>
+              <a:ext uri="{FF2B5EF4-FFF2-40B4-BE49-F238E27FC236}">
+                <a16:creationId xmlns:a16="http://schemas.microsoft.com/office/drawing/2014/main" id="{89627378-AB15-4965-8D32-44EC3C88B76D}"/>
+              </a:ext>
+            </a:extLst>
+          </p:cNvPr>
+          <p:cNvSpPr>
+            <a:spLocks noGrp="1"/>
+          </p:cNvSpPr>
+          <p:nvPr>
+            <p:ph idx="1"/>
+          </p:nvPr>
+        </p:nvSpPr>
+        <p:spPr/>
+        <p:txBody>
+          <a:bodyPr/>
+          <a:lstStyle/>
+          <a:p>
+            <a:endParaRPr lang="en-SG"/>
+          </a:p>
+        </p:txBody>
+      </p:sp>
+      <p:pic>
+        <p:nvPicPr>
+          <p:cNvPr id="5" name="Picture 4">
+            <a:extLst>
+              <a:ext uri="{FF2B5EF4-FFF2-40B4-BE49-F238E27FC236}">
+                <a16:creationId xmlns:a16="http://schemas.microsoft.com/office/drawing/2014/main" id="{997D9BA3-EE92-47F1-A759-EA8EF86BC02E}"/>
+              </a:ext>
+            </a:extLst>
+          </p:cNvPr>
+          <p:cNvPicPr>
+            <a:picLocks noChangeAspect="1"/>
+          </p:cNvPicPr>
+          <p:nvPr/>
+        </p:nvPicPr>
+        <p:blipFill>
+          <a:blip r:embed="rId2"/>
+          <a:stretch>
+            <a:fillRect/>
+          </a:stretch>
+        </p:blipFill>
+        <p:spPr>
+          <a:xfrm>
+            <a:off x="0" y="709513"/>
+            <a:ext cx="4572000" cy="1324173"/>
+          </a:xfrm>
+          <a:prstGeom prst="rect">
+            <a:avLst/>
+          </a:prstGeom>
+        </p:spPr>
+      </p:pic>
+    </p:spTree>
+    <p:extLst>
+      <p:ext uri="{BB962C8B-B14F-4D97-AF65-F5344CB8AC3E}">
+        <p14:creationId xmlns:p14="http://schemas.microsoft.com/office/powerpoint/2010/main" val="2627554738"/>
+      </p:ext>
+    </p:extLst>
+  </p:cSld>
+  <p:clrMapOvr>
+    <a:masterClrMapping/>
+  </p:clrMapOvr>
+</p:sld>
+</file>
+
 <file path=ppt/slides/slide2.xml><?xml version="1.0" encoding="utf-8"?>
 <p:sld xmlns:a="http://schemas.openxmlformats.org/drawingml/2006/main" xmlns:r="http://schemas.openxmlformats.org/officeDocument/2006/relationships" xmlns:p="http://schemas.openxmlformats.org/presentationml/2006/main">
   <p:cSld>

</xml_diff>